<commit_message>
V1 Complete! Completed 'addCompanySlides.ts'; added server responses for UX
</commit_message>
<xml_diff>
--- a/demo.pptx
+++ b/demo.pptx
@@ -8,9 +8,16 @@
     <p:sldId id="256" r:id="rId2"/>
     <p:sldId id="257" r:id="rId3"/>
     <p:sldId id="258" r:id="rId4"/>
+    <p:sldId id="259" r:id="rId5"/>
+    <p:sldId id="260" r:id="rId6"/>
+    <p:sldId id="261" r:id="rId7"/>
+    <p:sldId id="262" r:id="rId8"/>
+    <p:sldId id="263" r:id="rId9"/>
+    <p:sldId id="264" r:id="rId10"/>
+    <p:sldId id="265" r:id="rId11"/>
   </p:sldIdLst>
   <p:notesMasterIdLst>
-    <p:notesMasterId r:id="rId5"/>
+    <p:notesMasterId r:id="rId12"/>
   </p:notesMasterIdLst>
   <p:sldSz cx="9144000" cy="5143500"/>
   <p:notesSz cx="5143500" cy="9144000"/>
@@ -546,6 +553,94 @@
 </p:notes>
 </file>
 
+<file path=ppt/notesSlides/notesSlide10.xml><?xml version="1.0" encoding="utf-8"?>
+<p:notes xmlns:a="http://schemas.openxmlformats.org/drawingml/2006/main" xmlns:r="http://schemas.openxmlformats.org/officeDocument/2006/relationships" xmlns:p="http://schemas.openxmlformats.org/presentationml/2006/main">
+  <p:cSld>
+    <p:spTree>
+      <p:nvGrpSpPr>
+        <p:cNvPr id="1" name=""/>
+        <p:cNvGrpSpPr/>
+        <p:nvPr/>
+      </p:nvGrpSpPr>
+      <p:grpSpPr>
+        <a:xfrm>
+          <a:off x="0" y="0"/>
+          <a:ext cx="0" cy="0"/>
+          <a:chOff x="0" y="0"/>
+          <a:chExt cx="0" cy="0"/>
+        </a:xfrm>
+      </p:grpSpPr>
+      <p:sp>
+        <p:nvSpPr>
+          <p:cNvPr id="2" name="Slide Image Placeholder 1"/>
+          <p:cNvSpPr>
+            <a:spLocks noGrp="1" noRot="1" noChangeAspect="1"/>
+          </p:cNvSpPr>
+          <p:nvPr>
+            <p:ph type="sldImg"/>
+          </p:nvPr>
+        </p:nvSpPr>
+        <p:spPr/>
+      </p:sp>
+      <p:sp>
+        <p:nvSpPr>
+          <p:cNvPr id="3" name="Notes Placeholder 2"/>
+          <p:cNvSpPr>
+            <a:spLocks noGrp="1"/>
+          </p:cNvSpPr>
+          <p:nvPr>
+            <p:ph type="body" idx="1"/>
+          </p:nvPr>
+        </p:nvSpPr>
+        <p:spPr/>
+        <p:txBody>
+          <a:bodyPr/>
+          <a:lstStyle/>
+          <a:p>
+            <a:r>
+              <a:rPr lang="en-US" dirty="0"/>
+              <a:t/>
+            </a:r>
+            <a:endParaRPr lang="en-US" dirty="0"/>
+          </a:p>
+        </p:txBody>
+      </p:sp>
+      <p:sp>
+        <p:nvSpPr>
+          <p:cNvPr id="4" name="Slide Number Placeholder 3"/>
+          <p:cNvSpPr>
+            <a:spLocks noGrp="1"/>
+          </p:cNvSpPr>
+          <p:nvPr>
+            <p:ph type="sldNum" sz="quarter" idx="10"/>
+          </p:nvPr>
+        </p:nvSpPr>
+        <p:spPr/>
+        <p:txBody>
+          <a:bodyPr/>
+          <a:lstStyle/>
+          <a:p>
+            <a:fld id="{F7021451-1387-4CA6-816F-3879F97B5CBC}" type="slidenum">
+              <a:rPr lang="en-US"/>
+              <a:t>10</a:t>
+            </a:fld>
+            <a:endParaRPr lang="en-US"/>
+          </a:p>
+        </p:txBody>
+      </p:sp>
+    </p:spTree>
+    <p:extLst>
+      <p:ext uri="{BB962C8B-B14F-4D97-AF65-F5344CB8AC3E}">
+        <p14:creationId xmlns:p14="http://schemas.microsoft.com/office/powerpoint/2010/main" val="1024086991"/>
+      </p:ext>
+    </p:extLst>
+  </p:cSld>
+  <p:clrMapOvr>
+    <a:masterClrMapping/>
+  </p:clrMapOvr>
+</p:notes>
+</file>
+
 <file path=ppt/notesSlides/notesSlide2.xml><?xml version="1.0" encoding="utf-8"?>
 <p:notes xmlns:a="http://schemas.openxmlformats.org/drawingml/2006/main" xmlns:r="http://schemas.openxmlformats.org/officeDocument/2006/relationships" xmlns:p="http://schemas.openxmlformats.org/presentationml/2006/main">
   <p:cSld>
@@ -704,6 +799,534 @@
             <a:fld id="{F7021451-1387-4CA6-816F-3879F97B5CBC}" type="slidenum">
               <a:rPr lang="en-US"/>
               <a:t>3</a:t>
+            </a:fld>
+            <a:endParaRPr lang="en-US"/>
+          </a:p>
+        </p:txBody>
+      </p:sp>
+    </p:spTree>
+    <p:extLst>
+      <p:ext uri="{BB962C8B-B14F-4D97-AF65-F5344CB8AC3E}">
+        <p14:creationId xmlns:p14="http://schemas.microsoft.com/office/powerpoint/2010/main" val="1024086991"/>
+      </p:ext>
+    </p:extLst>
+  </p:cSld>
+  <p:clrMapOvr>
+    <a:masterClrMapping/>
+  </p:clrMapOvr>
+</p:notes>
+</file>
+
+<file path=ppt/notesSlides/notesSlide4.xml><?xml version="1.0" encoding="utf-8"?>
+<p:notes xmlns:a="http://schemas.openxmlformats.org/drawingml/2006/main" xmlns:r="http://schemas.openxmlformats.org/officeDocument/2006/relationships" xmlns:p="http://schemas.openxmlformats.org/presentationml/2006/main">
+  <p:cSld>
+    <p:spTree>
+      <p:nvGrpSpPr>
+        <p:cNvPr id="1" name=""/>
+        <p:cNvGrpSpPr/>
+        <p:nvPr/>
+      </p:nvGrpSpPr>
+      <p:grpSpPr>
+        <a:xfrm>
+          <a:off x="0" y="0"/>
+          <a:ext cx="0" cy="0"/>
+          <a:chOff x="0" y="0"/>
+          <a:chExt cx="0" cy="0"/>
+        </a:xfrm>
+      </p:grpSpPr>
+      <p:sp>
+        <p:nvSpPr>
+          <p:cNvPr id="2" name="Slide Image Placeholder 1"/>
+          <p:cNvSpPr>
+            <a:spLocks noGrp="1" noRot="1" noChangeAspect="1"/>
+          </p:cNvSpPr>
+          <p:nvPr>
+            <p:ph type="sldImg"/>
+          </p:nvPr>
+        </p:nvSpPr>
+        <p:spPr/>
+      </p:sp>
+      <p:sp>
+        <p:nvSpPr>
+          <p:cNvPr id="3" name="Notes Placeholder 2"/>
+          <p:cNvSpPr>
+            <a:spLocks noGrp="1"/>
+          </p:cNvSpPr>
+          <p:nvPr>
+            <p:ph type="body" idx="1"/>
+          </p:nvPr>
+        </p:nvSpPr>
+        <p:spPr/>
+        <p:txBody>
+          <a:bodyPr/>
+          <a:lstStyle/>
+          <a:p>
+            <a:r>
+              <a:rPr lang="en-US" dirty="0"/>
+              <a:t/>
+            </a:r>
+            <a:endParaRPr lang="en-US" dirty="0"/>
+          </a:p>
+        </p:txBody>
+      </p:sp>
+      <p:sp>
+        <p:nvSpPr>
+          <p:cNvPr id="4" name="Slide Number Placeholder 3"/>
+          <p:cNvSpPr>
+            <a:spLocks noGrp="1"/>
+          </p:cNvSpPr>
+          <p:nvPr>
+            <p:ph type="sldNum" sz="quarter" idx="10"/>
+          </p:nvPr>
+        </p:nvSpPr>
+        <p:spPr/>
+        <p:txBody>
+          <a:bodyPr/>
+          <a:lstStyle/>
+          <a:p>
+            <a:fld id="{F7021451-1387-4CA6-816F-3879F97B5CBC}" type="slidenum">
+              <a:rPr lang="en-US"/>
+              <a:t>4</a:t>
+            </a:fld>
+            <a:endParaRPr lang="en-US"/>
+          </a:p>
+        </p:txBody>
+      </p:sp>
+    </p:spTree>
+    <p:extLst>
+      <p:ext uri="{BB962C8B-B14F-4D97-AF65-F5344CB8AC3E}">
+        <p14:creationId xmlns:p14="http://schemas.microsoft.com/office/powerpoint/2010/main" val="1024086991"/>
+      </p:ext>
+    </p:extLst>
+  </p:cSld>
+  <p:clrMapOvr>
+    <a:masterClrMapping/>
+  </p:clrMapOvr>
+</p:notes>
+</file>
+
+<file path=ppt/notesSlides/notesSlide5.xml><?xml version="1.0" encoding="utf-8"?>
+<p:notes xmlns:a="http://schemas.openxmlformats.org/drawingml/2006/main" xmlns:r="http://schemas.openxmlformats.org/officeDocument/2006/relationships" xmlns:p="http://schemas.openxmlformats.org/presentationml/2006/main">
+  <p:cSld>
+    <p:spTree>
+      <p:nvGrpSpPr>
+        <p:cNvPr id="1" name=""/>
+        <p:cNvGrpSpPr/>
+        <p:nvPr/>
+      </p:nvGrpSpPr>
+      <p:grpSpPr>
+        <a:xfrm>
+          <a:off x="0" y="0"/>
+          <a:ext cx="0" cy="0"/>
+          <a:chOff x="0" y="0"/>
+          <a:chExt cx="0" cy="0"/>
+        </a:xfrm>
+      </p:grpSpPr>
+      <p:sp>
+        <p:nvSpPr>
+          <p:cNvPr id="2" name="Slide Image Placeholder 1"/>
+          <p:cNvSpPr>
+            <a:spLocks noGrp="1" noRot="1" noChangeAspect="1"/>
+          </p:cNvSpPr>
+          <p:nvPr>
+            <p:ph type="sldImg"/>
+          </p:nvPr>
+        </p:nvSpPr>
+        <p:spPr/>
+      </p:sp>
+      <p:sp>
+        <p:nvSpPr>
+          <p:cNvPr id="3" name="Notes Placeholder 2"/>
+          <p:cNvSpPr>
+            <a:spLocks noGrp="1"/>
+          </p:cNvSpPr>
+          <p:nvPr>
+            <p:ph type="body" idx="1"/>
+          </p:nvPr>
+        </p:nvSpPr>
+        <p:spPr/>
+        <p:txBody>
+          <a:bodyPr/>
+          <a:lstStyle/>
+          <a:p>
+            <a:r>
+              <a:rPr lang="en-US" dirty="0"/>
+              <a:t/>
+            </a:r>
+            <a:endParaRPr lang="en-US" dirty="0"/>
+          </a:p>
+        </p:txBody>
+      </p:sp>
+      <p:sp>
+        <p:nvSpPr>
+          <p:cNvPr id="4" name="Slide Number Placeholder 3"/>
+          <p:cNvSpPr>
+            <a:spLocks noGrp="1"/>
+          </p:cNvSpPr>
+          <p:nvPr>
+            <p:ph type="sldNum" sz="quarter" idx="10"/>
+          </p:nvPr>
+        </p:nvSpPr>
+        <p:spPr/>
+        <p:txBody>
+          <a:bodyPr/>
+          <a:lstStyle/>
+          <a:p>
+            <a:fld id="{F7021451-1387-4CA6-816F-3879F97B5CBC}" type="slidenum">
+              <a:rPr lang="en-US"/>
+              <a:t>5</a:t>
+            </a:fld>
+            <a:endParaRPr lang="en-US"/>
+          </a:p>
+        </p:txBody>
+      </p:sp>
+    </p:spTree>
+    <p:extLst>
+      <p:ext uri="{BB962C8B-B14F-4D97-AF65-F5344CB8AC3E}">
+        <p14:creationId xmlns:p14="http://schemas.microsoft.com/office/powerpoint/2010/main" val="1024086991"/>
+      </p:ext>
+    </p:extLst>
+  </p:cSld>
+  <p:clrMapOvr>
+    <a:masterClrMapping/>
+  </p:clrMapOvr>
+</p:notes>
+</file>
+
+<file path=ppt/notesSlides/notesSlide6.xml><?xml version="1.0" encoding="utf-8"?>
+<p:notes xmlns:a="http://schemas.openxmlformats.org/drawingml/2006/main" xmlns:r="http://schemas.openxmlformats.org/officeDocument/2006/relationships" xmlns:p="http://schemas.openxmlformats.org/presentationml/2006/main">
+  <p:cSld>
+    <p:spTree>
+      <p:nvGrpSpPr>
+        <p:cNvPr id="1" name=""/>
+        <p:cNvGrpSpPr/>
+        <p:nvPr/>
+      </p:nvGrpSpPr>
+      <p:grpSpPr>
+        <a:xfrm>
+          <a:off x="0" y="0"/>
+          <a:ext cx="0" cy="0"/>
+          <a:chOff x="0" y="0"/>
+          <a:chExt cx="0" cy="0"/>
+        </a:xfrm>
+      </p:grpSpPr>
+      <p:sp>
+        <p:nvSpPr>
+          <p:cNvPr id="2" name="Slide Image Placeholder 1"/>
+          <p:cNvSpPr>
+            <a:spLocks noGrp="1" noRot="1" noChangeAspect="1"/>
+          </p:cNvSpPr>
+          <p:nvPr>
+            <p:ph type="sldImg"/>
+          </p:nvPr>
+        </p:nvSpPr>
+        <p:spPr/>
+      </p:sp>
+      <p:sp>
+        <p:nvSpPr>
+          <p:cNvPr id="3" name="Notes Placeholder 2"/>
+          <p:cNvSpPr>
+            <a:spLocks noGrp="1"/>
+          </p:cNvSpPr>
+          <p:nvPr>
+            <p:ph type="body" idx="1"/>
+          </p:nvPr>
+        </p:nvSpPr>
+        <p:spPr/>
+        <p:txBody>
+          <a:bodyPr/>
+          <a:lstStyle/>
+          <a:p>
+            <a:r>
+              <a:rPr lang="en-US" dirty="0"/>
+              <a:t/>
+            </a:r>
+            <a:endParaRPr lang="en-US" dirty="0"/>
+          </a:p>
+        </p:txBody>
+      </p:sp>
+      <p:sp>
+        <p:nvSpPr>
+          <p:cNvPr id="4" name="Slide Number Placeholder 3"/>
+          <p:cNvSpPr>
+            <a:spLocks noGrp="1"/>
+          </p:cNvSpPr>
+          <p:nvPr>
+            <p:ph type="sldNum" sz="quarter" idx="10"/>
+          </p:nvPr>
+        </p:nvSpPr>
+        <p:spPr/>
+        <p:txBody>
+          <a:bodyPr/>
+          <a:lstStyle/>
+          <a:p>
+            <a:fld id="{F7021451-1387-4CA6-816F-3879F97B5CBC}" type="slidenum">
+              <a:rPr lang="en-US"/>
+              <a:t>6</a:t>
+            </a:fld>
+            <a:endParaRPr lang="en-US"/>
+          </a:p>
+        </p:txBody>
+      </p:sp>
+    </p:spTree>
+    <p:extLst>
+      <p:ext uri="{BB962C8B-B14F-4D97-AF65-F5344CB8AC3E}">
+        <p14:creationId xmlns:p14="http://schemas.microsoft.com/office/powerpoint/2010/main" val="1024086991"/>
+      </p:ext>
+    </p:extLst>
+  </p:cSld>
+  <p:clrMapOvr>
+    <a:masterClrMapping/>
+  </p:clrMapOvr>
+</p:notes>
+</file>
+
+<file path=ppt/notesSlides/notesSlide7.xml><?xml version="1.0" encoding="utf-8"?>
+<p:notes xmlns:a="http://schemas.openxmlformats.org/drawingml/2006/main" xmlns:r="http://schemas.openxmlformats.org/officeDocument/2006/relationships" xmlns:p="http://schemas.openxmlformats.org/presentationml/2006/main">
+  <p:cSld>
+    <p:spTree>
+      <p:nvGrpSpPr>
+        <p:cNvPr id="1" name=""/>
+        <p:cNvGrpSpPr/>
+        <p:nvPr/>
+      </p:nvGrpSpPr>
+      <p:grpSpPr>
+        <a:xfrm>
+          <a:off x="0" y="0"/>
+          <a:ext cx="0" cy="0"/>
+          <a:chOff x="0" y="0"/>
+          <a:chExt cx="0" cy="0"/>
+        </a:xfrm>
+      </p:grpSpPr>
+      <p:sp>
+        <p:nvSpPr>
+          <p:cNvPr id="2" name="Slide Image Placeholder 1"/>
+          <p:cNvSpPr>
+            <a:spLocks noGrp="1" noRot="1" noChangeAspect="1"/>
+          </p:cNvSpPr>
+          <p:nvPr>
+            <p:ph type="sldImg"/>
+          </p:nvPr>
+        </p:nvSpPr>
+        <p:spPr/>
+      </p:sp>
+      <p:sp>
+        <p:nvSpPr>
+          <p:cNvPr id="3" name="Notes Placeholder 2"/>
+          <p:cNvSpPr>
+            <a:spLocks noGrp="1"/>
+          </p:cNvSpPr>
+          <p:nvPr>
+            <p:ph type="body" idx="1"/>
+          </p:nvPr>
+        </p:nvSpPr>
+        <p:spPr/>
+        <p:txBody>
+          <a:bodyPr/>
+          <a:lstStyle/>
+          <a:p>
+            <a:r>
+              <a:rPr lang="en-US" dirty="0"/>
+              <a:t/>
+            </a:r>
+            <a:endParaRPr lang="en-US" dirty="0"/>
+          </a:p>
+        </p:txBody>
+      </p:sp>
+      <p:sp>
+        <p:nvSpPr>
+          <p:cNvPr id="4" name="Slide Number Placeholder 3"/>
+          <p:cNvSpPr>
+            <a:spLocks noGrp="1"/>
+          </p:cNvSpPr>
+          <p:nvPr>
+            <p:ph type="sldNum" sz="quarter" idx="10"/>
+          </p:nvPr>
+        </p:nvSpPr>
+        <p:spPr/>
+        <p:txBody>
+          <a:bodyPr/>
+          <a:lstStyle/>
+          <a:p>
+            <a:fld id="{F7021451-1387-4CA6-816F-3879F97B5CBC}" type="slidenum">
+              <a:rPr lang="en-US"/>
+              <a:t>7</a:t>
+            </a:fld>
+            <a:endParaRPr lang="en-US"/>
+          </a:p>
+        </p:txBody>
+      </p:sp>
+    </p:spTree>
+    <p:extLst>
+      <p:ext uri="{BB962C8B-B14F-4D97-AF65-F5344CB8AC3E}">
+        <p14:creationId xmlns:p14="http://schemas.microsoft.com/office/powerpoint/2010/main" val="1024086991"/>
+      </p:ext>
+    </p:extLst>
+  </p:cSld>
+  <p:clrMapOvr>
+    <a:masterClrMapping/>
+  </p:clrMapOvr>
+</p:notes>
+</file>
+
+<file path=ppt/notesSlides/notesSlide8.xml><?xml version="1.0" encoding="utf-8"?>
+<p:notes xmlns:a="http://schemas.openxmlformats.org/drawingml/2006/main" xmlns:r="http://schemas.openxmlformats.org/officeDocument/2006/relationships" xmlns:p="http://schemas.openxmlformats.org/presentationml/2006/main">
+  <p:cSld>
+    <p:spTree>
+      <p:nvGrpSpPr>
+        <p:cNvPr id="1" name=""/>
+        <p:cNvGrpSpPr/>
+        <p:nvPr/>
+      </p:nvGrpSpPr>
+      <p:grpSpPr>
+        <a:xfrm>
+          <a:off x="0" y="0"/>
+          <a:ext cx="0" cy="0"/>
+          <a:chOff x="0" y="0"/>
+          <a:chExt cx="0" cy="0"/>
+        </a:xfrm>
+      </p:grpSpPr>
+      <p:sp>
+        <p:nvSpPr>
+          <p:cNvPr id="2" name="Slide Image Placeholder 1"/>
+          <p:cNvSpPr>
+            <a:spLocks noGrp="1" noRot="1" noChangeAspect="1"/>
+          </p:cNvSpPr>
+          <p:nvPr>
+            <p:ph type="sldImg"/>
+          </p:nvPr>
+        </p:nvSpPr>
+        <p:spPr/>
+      </p:sp>
+      <p:sp>
+        <p:nvSpPr>
+          <p:cNvPr id="3" name="Notes Placeholder 2"/>
+          <p:cNvSpPr>
+            <a:spLocks noGrp="1"/>
+          </p:cNvSpPr>
+          <p:nvPr>
+            <p:ph type="body" idx="1"/>
+          </p:nvPr>
+        </p:nvSpPr>
+        <p:spPr/>
+        <p:txBody>
+          <a:bodyPr/>
+          <a:lstStyle/>
+          <a:p>
+            <a:r>
+              <a:rPr lang="en-US" dirty="0"/>
+              <a:t/>
+            </a:r>
+            <a:endParaRPr lang="en-US" dirty="0"/>
+          </a:p>
+        </p:txBody>
+      </p:sp>
+      <p:sp>
+        <p:nvSpPr>
+          <p:cNvPr id="4" name="Slide Number Placeholder 3"/>
+          <p:cNvSpPr>
+            <a:spLocks noGrp="1"/>
+          </p:cNvSpPr>
+          <p:nvPr>
+            <p:ph type="sldNum" sz="quarter" idx="10"/>
+          </p:nvPr>
+        </p:nvSpPr>
+        <p:spPr/>
+        <p:txBody>
+          <a:bodyPr/>
+          <a:lstStyle/>
+          <a:p>
+            <a:fld id="{F7021451-1387-4CA6-816F-3879F97B5CBC}" type="slidenum">
+              <a:rPr lang="en-US"/>
+              <a:t>8</a:t>
+            </a:fld>
+            <a:endParaRPr lang="en-US"/>
+          </a:p>
+        </p:txBody>
+      </p:sp>
+    </p:spTree>
+    <p:extLst>
+      <p:ext uri="{BB962C8B-B14F-4D97-AF65-F5344CB8AC3E}">
+        <p14:creationId xmlns:p14="http://schemas.microsoft.com/office/powerpoint/2010/main" val="1024086991"/>
+      </p:ext>
+    </p:extLst>
+  </p:cSld>
+  <p:clrMapOvr>
+    <a:masterClrMapping/>
+  </p:clrMapOvr>
+</p:notes>
+</file>
+
+<file path=ppt/notesSlides/notesSlide9.xml><?xml version="1.0" encoding="utf-8"?>
+<p:notes xmlns:a="http://schemas.openxmlformats.org/drawingml/2006/main" xmlns:r="http://schemas.openxmlformats.org/officeDocument/2006/relationships" xmlns:p="http://schemas.openxmlformats.org/presentationml/2006/main">
+  <p:cSld>
+    <p:spTree>
+      <p:nvGrpSpPr>
+        <p:cNvPr id="1" name=""/>
+        <p:cNvGrpSpPr/>
+        <p:nvPr/>
+      </p:nvGrpSpPr>
+      <p:grpSpPr>
+        <a:xfrm>
+          <a:off x="0" y="0"/>
+          <a:ext cx="0" cy="0"/>
+          <a:chOff x="0" y="0"/>
+          <a:chExt cx="0" cy="0"/>
+        </a:xfrm>
+      </p:grpSpPr>
+      <p:sp>
+        <p:nvSpPr>
+          <p:cNvPr id="2" name="Slide Image Placeholder 1"/>
+          <p:cNvSpPr>
+            <a:spLocks noGrp="1" noRot="1" noChangeAspect="1"/>
+          </p:cNvSpPr>
+          <p:nvPr>
+            <p:ph type="sldImg"/>
+          </p:nvPr>
+        </p:nvSpPr>
+        <p:spPr/>
+      </p:sp>
+      <p:sp>
+        <p:nvSpPr>
+          <p:cNvPr id="3" name="Notes Placeholder 2"/>
+          <p:cNvSpPr>
+            <a:spLocks noGrp="1"/>
+          </p:cNvSpPr>
+          <p:nvPr>
+            <p:ph type="body" idx="1"/>
+          </p:nvPr>
+        </p:nvSpPr>
+        <p:spPr/>
+        <p:txBody>
+          <a:bodyPr/>
+          <a:lstStyle/>
+          <a:p>
+            <a:r>
+              <a:rPr lang="en-US" dirty="0"/>
+              <a:t/>
+            </a:r>
+            <a:endParaRPr lang="en-US" dirty="0"/>
+          </a:p>
+        </p:txBody>
+      </p:sp>
+      <p:sp>
+        <p:nvSpPr>
+          <p:cNvPr id="4" name="Slide Number Placeholder 3"/>
+          <p:cNvSpPr>
+            <a:spLocks noGrp="1"/>
+          </p:cNvSpPr>
+          <p:nvPr>
+            <p:ph type="sldNum" sz="quarter" idx="10"/>
+          </p:nvPr>
+        </p:nvSpPr>
+        <p:spPr/>
+        <p:txBody>
+          <a:bodyPr/>
+          <a:lstStyle/>
+          <a:p>
+            <a:fld id="{F7021451-1387-4CA6-816F-3879F97B5CBC}" type="slidenum">
+              <a:rPr lang="en-US"/>
+              <a:t>9</a:t>
             </a:fld>
             <a:endParaRPr lang="en-US"/>
           </a:p>
@@ -1174,9 +1797,179 @@
                   <a:srgbClr val="05FFA6"/>
                 </a:solidFill>
               </a:rPr>
-              <a:t>Jul 28 2025</a:t>
+              <a:t>Jul 29 2025</a:t>
             </a:r>
             <a:endParaRPr lang="en-US" sz="1700" dirty="0"/>
+          </a:p>
+        </p:txBody>
+      </p:sp>
+    </p:spTree>
+  </p:cSld>
+  <p:clrMapOvr>
+    <a:masterClrMapping/>
+  </p:clrMapOvr>
+</p:sld>
+</file>
+
+<file path=ppt/slides/slide10.xml><?xml version="1.0" encoding="utf-8"?>
+<p:sld xmlns:a="http://schemas.openxmlformats.org/drawingml/2006/main" xmlns:r="http://schemas.openxmlformats.org/officeDocument/2006/relationships" xmlns:p="http://schemas.openxmlformats.org/presentationml/2006/main">
+  <p:cSld name="Slide 10">
+    <p:bg>
+      <p:bgPr>
+        <a:blipFill dpi="0" rotWithShape="1">
+          <a:blip r:embed="rId1">
+            <a:lum/>
+          </a:blip>
+          <a:srcRect/>
+          <a:stretch>
+            <a:fillRect/>
+          </a:stretch>
+        </a:blipFill>
+        <a:effectLst/>
+      </p:bgPr>
+    </p:bg>
+    <p:spTree>
+      <p:nvGrpSpPr>
+        <p:cNvPr id="1" name=""/>
+        <p:cNvGrpSpPr/>
+        <p:nvPr/>
+      </p:nvGrpSpPr>
+      <p:grpSpPr>
+        <a:xfrm>
+          <a:off x="0" y="0"/>
+          <a:ext cx="0" cy="0"/>
+          <a:chOff x="0" y="0"/>
+          <a:chExt cx="0" cy="0"/>
+        </a:xfrm>
+      </p:grpSpPr>
+      <p:pic>
+        <p:nvPicPr>
+          <p:cNvPr id="2" name="Image 0" descr="https://d1csarkz8obe9u.cloudfront.net/posterpreviews/company-logo-logo-design-template-2631a0f82aff3d9b48e2513cfb234c23_screen.jpg?ts=1667643256">    </p:cNvPr>
+          <p:cNvPicPr>
+            <a:picLocks noChangeAspect="1"/>
+          </p:cNvPicPr>
+          <p:nvPr/>
+        </p:nvPicPr>
+        <p:blipFill>
+          <a:blip r:embed="rId2"/>
+          <a:srcRect l="0" r="0" t="0" b="0"/>
+          <a:stretch/>
+        </p:blipFill>
+        <p:spPr>
+          <a:xfrm>
+            <a:off x="7955280" y="4474845"/>
+            <a:ext cx="914400" cy="514350"/>
+          </a:xfrm>
+          <a:prstGeom prst="rect">
+            <a:avLst/>
+          </a:prstGeom>
+        </p:spPr>
+      </p:pic>
+      <p:sp>
+        <p:nvSpPr>
+          <p:cNvPr id="3" name="Text 0"/>
+          <p:cNvSpPr/>
+          <p:nvPr/>
+        </p:nvSpPr>
+        <p:spPr>
+          <a:xfrm>
+            <a:off x="457200" y="411480"/>
+            <a:ext cx="7315200" cy="411480"/>
+          </a:xfrm>
+          <a:prstGeom prst="rect">
+            <a:avLst/>
+          </a:prstGeom>
+          <a:noFill/>
+          <a:ln/>
+        </p:spPr>
+        <p:txBody>
+          <a:bodyPr wrap="square" rtlCol="0" anchor="ctr"/>
+          <a:lstStyle/>
+          <a:p>
+            <a:pPr algn="l" indent="0" marL="0">
+              <a:buNone/>
+            </a:pPr>
+            <a:r>
+              <a:rPr lang="en-US" sz="3600" dirty="0">
+                <a:solidFill>
+                  <a:srgbClr val="000000"/>
+                </a:solidFill>
+              </a:rPr>
+              <a:t>The Ask</a:t>
+            </a:r>
+            <a:endParaRPr lang="en-US" sz="3600" dirty="0"/>
+          </a:p>
+        </p:txBody>
+      </p:sp>
+      <p:sp>
+        <p:nvSpPr>
+          <p:cNvPr id="4" name="Text 1"/>
+          <p:cNvSpPr/>
+          <p:nvPr/>
+        </p:nvSpPr>
+        <p:spPr>
+          <a:xfrm>
+            <a:off x="457200" y="874395"/>
+            <a:ext cx="7315200" cy="205740"/>
+          </a:xfrm>
+          <a:prstGeom prst="rect">
+            <a:avLst/>
+          </a:prstGeom>
+          <a:noFill/>
+          <a:ln/>
+        </p:spPr>
+        <p:txBody>
+          <a:bodyPr wrap="square" rtlCol="0" anchor="ctr"/>
+          <a:lstStyle/>
+          <a:p>
+            <a:pPr algn="l" indent="0" marL="0">
+              <a:buNone/>
+            </a:pPr>
+            <a:r>
+              <a:rPr lang="en-US" sz="2000" dirty="0">
+                <a:solidFill>
+                  <a:srgbClr val="000000"/>
+                </a:solidFill>
+              </a:rPr>
+              <a:t>http://biomr.io</a:t>
+            </a:r>
+            <a:endParaRPr lang="en-US" sz="2000" dirty="0"/>
+          </a:p>
+        </p:txBody>
+      </p:sp>
+      <p:sp>
+        <p:nvSpPr>
+          <p:cNvPr id="5" name="Text 2"/>
+          <p:cNvSpPr/>
+          <p:nvPr/>
+        </p:nvSpPr>
+        <p:spPr>
+          <a:xfrm>
+            <a:off x="457200" y="1183005"/>
+            <a:ext cx="7315200" cy="3086100"/>
+          </a:xfrm>
+          <a:prstGeom prst="rect">
+            <a:avLst/>
+          </a:prstGeom>
+          <a:noFill/>
+          <a:ln/>
+        </p:spPr>
+        <p:txBody>
+          <a:bodyPr wrap="square" rtlCol="0" anchor="ctr"/>
+          <a:lstStyle/>
+          <a:p>
+            <a:pPr algn="l" indent="0" marL="0">
+              <a:buNone/>
+            </a:pPr>
+            <a:r>
+              <a:rPr lang="en-US" sz="2000" dirty="0">
+                <a:solidFill>
+                  <a:srgbClr val="000000"/>
+                </a:solidFill>
+              </a:rPr>
+              <a:t>Duncan Turner is looking for...</a:t>
+            </a:r>
+            <a:endParaRPr lang="en-US" sz="2000" dirty="0"/>
           </a:p>
         </p:txBody>
       </p:sp>
@@ -1221,7 +2014,7 @@
       </p:grpSpPr>
       <p:pic>
         <p:nvPicPr>
-          <p:cNvPr id="2" name="Image 0" descr="https://static.thenounproject.com/png/504708-200.png">    </p:cNvPr>
+          <p:cNvPr id="2" name="Image 0" descr="https://t4.ftcdn.net/jpg/06/18/70/35/360_F_618703552_WeVTEs8XmeEb1hGiEZ5ZjJXSbx4yiiPm.jpg">    </p:cNvPr>
           <p:cNvPicPr>
             <a:picLocks noChangeAspect="1"/>
           </p:cNvPicPr>
@@ -1272,7 +2065,7 @@
                   <a:srgbClr val="000000"/>
                 </a:solidFill>
               </a:rPr>
-              <a:t>Test Company</a:t>
+              <a:t>3rd Ear</a:t>
             </a:r>
             <a:endParaRPr lang="en-US" sz="4000" dirty="0"/>
           </a:p>
@@ -1308,7 +2101,7 @@
                   <a:srgbClr val="000000"/>
                 </a:solidFill>
               </a:rPr>
-              <a:t>A test company that literally fulfills ALL of your testing needs</a:t>
+              <a:t>Connect the World be One™</a:t>
             </a:r>
             <a:endParaRPr lang="en-US" sz="2000" dirty="0"/>
           </a:p>
@@ -1355,7 +2148,7 @@
       </p:grpSpPr>
       <p:pic>
         <p:nvPicPr>
-          <p:cNvPr id="2" name="Image 0" descr="https://static.thenounproject.com/png/504708-200.png">    </p:cNvPr>
+          <p:cNvPr id="2" name="Image 0" descr="https://t4.ftcdn.net/jpg/06/18/70/35/360_F_618703552_WeVTEs8XmeEb1hGiEZ5ZjJXSbx4yiiPm.jpg">    </p:cNvPr>
           <p:cNvPicPr>
             <a:picLocks noChangeAspect="1"/>
           </p:cNvPicPr>
@@ -1406,7 +2199,7 @@
                   <a:srgbClr val="000000"/>
                 </a:solidFill>
               </a:rPr>
-              <a:t>Healthcare/Dentistry/Other Things</a:t>
+              <a:t>Consumer Devices, Consumer Devices</a:t>
             </a:r>
             <a:endParaRPr lang="en-US" sz="3600" dirty="0"/>
           </a:p>
@@ -1420,7 +2213,7 @@
         </p:nvSpPr>
         <p:spPr>
           <a:xfrm>
-            <a:off x="457200" y="822960"/>
+            <a:off x="457200" y="874395"/>
             <a:ext cx="7315200" cy="205740"/>
           </a:xfrm>
           <a:prstGeom prst="rect">
@@ -1442,7 +2235,7 @@
                   <a:srgbClr val="000000"/>
                 </a:solidFill>
               </a:rPr>
-              <a:t>France</a:t>
+              <a:t>United States</a:t>
             </a:r>
             <a:endParaRPr lang="en-US" sz="2000" dirty="0"/>
           </a:p>
@@ -1478,7 +2271,975 @@
                   <a:srgbClr val="000000"/>
                 </a:solidFill>
               </a:rPr>
-              <a:t>A really really really really really really really really really really really really really really really really really really really really really really really really really really long description.</a:t>
+              <a:t>Our first product, 3rdEar™, help people beyond the limitations of space and time.™</a:t>
+            </a:r>
+            <a:endParaRPr lang="en-US" sz="2000" dirty="0"/>
+          </a:p>
+        </p:txBody>
+      </p:sp>
+    </p:spTree>
+  </p:cSld>
+  <p:clrMapOvr>
+    <a:masterClrMapping/>
+  </p:clrMapOvr>
+</p:sld>
+</file>
+
+<file path=ppt/slides/slide4.xml><?xml version="1.0" encoding="utf-8"?>
+<p:sld xmlns:a="http://schemas.openxmlformats.org/drawingml/2006/main" xmlns:r="http://schemas.openxmlformats.org/officeDocument/2006/relationships" xmlns:p="http://schemas.openxmlformats.org/presentationml/2006/main">
+  <p:cSld name="Slide 4">
+    <p:bg>
+      <p:bgPr>
+        <a:blipFill dpi="0" rotWithShape="1">
+          <a:blip r:embed="rId1">
+            <a:lum/>
+          </a:blip>
+          <a:srcRect/>
+          <a:stretch>
+            <a:fillRect/>
+          </a:stretch>
+        </a:blipFill>
+        <a:effectLst/>
+      </p:bgPr>
+    </p:bg>
+    <p:spTree>
+      <p:nvGrpSpPr>
+        <p:cNvPr id="1" name=""/>
+        <p:cNvGrpSpPr/>
+        <p:nvPr/>
+      </p:nvGrpSpPr>
+      <p:grpSpPr>
+        <a:xfrm>
+          <a:off x="0" y="0"/>
+          <a:ext cx="0" cy="0"/>
+          <a:chOff x="0" y="0"/>
+          <a:chExt cx="0" cy="0"/>
+        </a:xfrm>
+      </p:grpSpPr>
+      <p:pic>
+        <p:nvPicPr>
+          <p:cNvPr id="2" name="Image 0" descr="https://t4.ftcdn.net/jpg/06/18/70/35/360_F_618703552_WeVTEs8XmeEb1hGiEZ5ZjJXSbx4yiiPm.jpg">    </p:cNvPr>
+          <p:cNvPicPr>
+            <a:picLocks noChangeAspect="1"/>
+          </p:cNvPicPr>
+          <p:nvPr/>
+        </p:nvPicPr>
+        <p:blipFill>
+          <a:blip r:embed="rId2"/>
+          <a:srcRect l="0" r="0" t="0" b="0"/>
+          <a:stretch/>
+        </p:blipFill>
+        <p:spPr>
+          <a:xfrm>
+            <a:off x="7955280" y="4474845"/>
+            <a:ext cx="914400" cy="514350"/>
+          </a:xfrm>
+          <a:prstGeom prst="rect">
+            <a:avLst/>
+          </a:prstGeom>
+        </p:spPr>
+      </p:pic>
+      <p:sp>
+        <p:nvSpPr>
+          <p:cNvPr id="3" name="Text 0"/>
+          <p:cNvSpPr/>
+          <p:nvPr/>
+        </p:nvSpPr>
+        <p:spPr>
+          <a:xfrm>
+            <a:off x="457200" y="411480"/>
+            <a:ext cx="7315200" cy="411480"/>
+          </a:xfrm>
+          <a:prstGeom prst="rect">
+            <a:avLst/>
+          </a:prstGeom>
+          <a:noFill/>
+          <a:ln/>
+        </p:spPr>
+        <p:txBody>
+          <a:bodyPr wrap="square" rtlCol="0" anchor="ctr"/>
+          <a:lstStyle/>
+          <a:p>
+            <a:pPr algn="l" indent="0" marL="0">
+              <a:buNone/>
+            </a:pPr>
+            <a:r>
+              <a:rPr lang="en-US" sz="3600" dirty="0">
+                <a:solidFill>
+                  <a:srgbClr val="000000"/>
+                </a:solidFill>
+              </a:rPr>
+              <a:t>The Ask</a:t>
+            </a:r>
+            <a:endParaRPr lang="en-US" sz="3600" dirty="0"/>
+          </a:p>
+        </p:txBody>
+      </p:sp>
+      <p:sp>
+        <p:nvSpPr>
+          <p:cNvPr id="4" name="Text 1"/>
+          <p:cNvSpPr/>
+          <p:nvPr/>
+        </p:nvSpPr>
+        <p:spPr>
+          <a:xfrm>
+            <a:off x="457200" y="874395"/>
+            <a:ext cx="7315200" cy="205740"/>
+          </a:xfrm>
+          <a:prstGeom prst="rect">
+            <a:avLst/>
+          </a:prstGeom>
+          <a:noFill/>
+          <a:ln/>
+        </p:spPr>
+        <p:txBody>
+          <a:bodyPr wrap="square" rtlCol="0" anchor="ctr"/>
+          <a:lstStyle/>
+          <a:p>
+            <a:pPr algn="l" indent="0" marL="0">
+              <a:buNone/>
+            </a:pPr>
+            <a:r>
+              <a:rPr lang="en-US" sz="2000" dirty="0">
+                <a:solidFill>
+                  <a:srgbClr val="000000"/>
+                </a:solidFill>
+              </a:rPr>
+              <a:t>http://gmg33.com</a:t>
+            </a:r>
+            <a:endParaRPr lang="en-US" sz="2000" dirty="0"/>
+          </a:p>
+        </p:txBody>
+      </p:sp>
+      <p:sp>
+        <p:nvSpPr>
+          <p:cNvPr id="5" name="Text 2"/>
+          <p:cNvSpPr/>
+          <p:nvPr/>
+        </p:nvSpPr>
+        <p:spPr>
+          <a:xfrm>
+            <a:off x="457200" y="1183005"/>
+            <a:ext cx="7315200" cy="3086100"/>
+          </a:xfrm>
+          <a:prstGeom prst="rect">
+            <a:avLst/>
+          </a:prstGeom>
+          <a:noFill/>
+          <a:ln/>
+        </p:spPr>
+        <p:txBody>
+          <a:bodyPr wrap="square" rtlCol="0" anchor="ctr"/>
+          <a:lstStyle/>
+          <a:p>
+            <a:pPr algn="l" indent="0" marL="0">
+              <a:buNone/>
+            </a:pPr>
+            <a:r>
+              <a:rPr lang="en-US" sz="2000" dirty="0">
+                <a:solidFill>
+                  <a:srgbClr val="000000"/>
+                </a:solidFill>
+              </a:rPr>
+              <a:t>Cyril Ebersweiler is looking for...</a:t>
+            </a:r>
+            <a:endParaRPr lang="en-US" sz="2000" dirty="0"/>
+          </a:p>
+        </p:txBody>
+      </p:sp>
+    </p:spTree>
+  </p:cSld>
+  <p:clrMapOvr>
+    <a:masterClrMapping/>
+  </p:clrMapOvr>
+</p:sld>
+</file>
+
+<file path=ppt/slides/slide5.xml><?xml version="1.0" encoding="utf-8"?>
+<p:sld xmlns:a="http://schemas.openxmlformats.org/drawingml/2006/main" xmlns:r="http://schemas.openxmlformats.org/officeDocument/2006/relationships" xmlns:p="http://schemas.openxmlformats.org/presentationml/2006/main">
+  <p:cSld name="Slide 5">
+    <p:bg>
+      <p:bgPr>
+        <a:blipFill dpi="0" rotWithShape="1">
+          <a:blip r:embed="rId1">
+            <a:lum/>
+          </a:blip>
+          <a:srcRect/>
+          <a:stretch>
+            <a:fillRect/>
+          </a:stretch>
+        </a:blipFill>
+        <a:effectLst/>
+      </p:bgPr>
+    </p:bg>
+    <p:spTree>
+      <p:nvGrpSpPr>
+        <p:cNvPr id="1" name=""/>
+        <p:cNvGrpSpPr/>
+        <p:nvPr/>
+      </p:nvGrpSpPr>
+      <p:grpSpPr>
+        <a:xfrm>
+          <a:off x="0" y="0"/>
+          <a:ext cx="0" cy="0"/>
+          <a:chOff x="0" y="0"/>
+          <a:chExt cx="0" cy="0"/>
+        </a:xfrm>
+      </p:grpSpPr>
+      <p:pic>
+        <p:nvPicPr>
+          <p:cNvPr id="2" name="Image 0" descr="https://d1csarkz8obe9u.cloudfront.net/posterpreviews/company-logo-design-template-e089327a5c476ce5c70c74f7359c5898_screen.jpg?ts=1672291305">    </p:cNvPr>
+          <p:cNvPicPr>
+            <a:picLocks noChangeAspect="1"/>
+          </p:cNvPicPr>
+          <p:nvPr/>
+        </p:nvPicPr>
+        <p:blipFill>
+          <a:blip r:embed="rId2"/>
+          <a:srcRect l="0" r="0" t="0" b="0"/>
+          <a:stretch/>
+        </p:blipFill>
+        <p:spPr>
+          <a:xfrm>
+            <a:off x="1097280" y="1028700"/>
+            <a:ext cx="2743200" cy="1285875"/>
+          </a:xfrm>
+          <a:prstGeom prst="rect">
+            <a:avLst/>
+          </a:prstGeom>
+        </p:spPr>
+      </p:pic>
+      <p:sp>
+        <p:nvSpPr>
+          <p:cNvPr id="3" name="Text 0"/>
+          <p:cNvSpPr/>
+          <p:nvPr/>
+        </p:nvSpPr>
+        <p:spPr>
+          <a:xfrm>
+            <a:off x="1097280" y="2314575"/>
+            <a:ext cx="3383280" cy="771525"/>
+          </a:xfrm>
+          <a:prstGeom prst="rect">
+            <a:avLst/>
+          </a:prstGeom>
+          <a:noFill/>
+          <a:ln/>
+        </p:spPr>
+        <p:txBody>
+          <a:bodyPr wrap="square" rtlCol="0" anchor="ctr"/>
+          <a:lstStyle/>
+          <a:p>
+            <a:pPr indent="0" marL="0">
+              <a:buNone/>
+            </a:pPr>
+            <a:r>
+              <a:rPr lang="en-US" sz="4000" dirty="0">
+                <a:solidFill>
+                  <a:srgbClr val="000000"/>
+                </a:solidFill>
+              </a:rPr>
+              <a:t>Lir Scientific</a:t>
+            </a:r>
+            <a:endParaRPr lang="en-US" sz="4000" dirty="0"/>
+          </a:p>
+        </p:txBody>
+      </p:sp>
+      <p:sp>
+        <p:nvSpPr>
+          <p:cNvPr id="4" name="Text 1"/>
+          <p:cNvSpPr/>
+          <p:nvPr/>
+        </p:nvSpPr>
+        <p:spPr>
+          <a:xfrm>
+            <a:off x="5486400" y="3343275"/>
+            <a:ext cx="3383280" cy="1543050"/>
+          </a:xfrm>
+          <a:prstGeom prst="rect">
+            <a:avLst/>
+          </a:prstGeom>
+          <a:noFill/>
+          <a:ln/>
+        </p:spPr>
+        <p:txBody>
+          <a:bodyPr wrap="square" rtlCol="0" anchor="ctr"/>
+          <a:lstStyle/>
+          <a:p>
+            <a:pPr algn="ctr" indent="0" marL="0">
+              <a:buNone/>
+            </a:pPr>
+            <a:r>
+              <a:rPr lang="en-US" sz="2000" dirty="0">
+                <a:solidFill>
+                  <a:srgbClr val="000000"/>
+                </a:solidFill>
+              </a:rPr>
+              <a:t>A pre-emptive bladder fullness sensor - the end of adult diapers.</a:t>
+            </a:r>
+            <a:endParaRPr lang="en-US" sz="2000" dirty="0"/>
+          </a:p>
+        </p:txBody>
+      </p:sp>
+    </p:spTree>
+  </p:cSld>
+  <p:clrMapOvr>
+    <a:masterClrMapping/>
+  </p:clrMapOvr>
+</p:sld>
+</file>
+
+<file path=ppt/slides/slide6.xml><?xml version="1.0" encoding="utf-8"?>
+<p:sld xmlns:a="http://schemas.openxmlformats.org/drawingml/2006/main" xmlns:r="http://schemas.openxmlformats.org/officeDocument/2006/relationships" xmlns:p="http://schemas.openxmlformats.org/presentationml/2006/main">
+  <p:cSld name="Slide 6">
+    <p:bg>
+      <p:bgPr>
+        <a:blipFill dpi="0" rotWithShape="1">
+          <a:blip r:embed="rId1">
+            <a:lum/>
+          </a:blip>
+          <a:srcRect/>
+          <a:stretch>
+            <a:fillRect/>
+          </a:stretch>
+        </a:blipFill>
+        <a:effectLst/>
+      </p:bgPr>
+    </p:bg>
+    <p:spTree>
+      <p:nvGrpSpPr>
+        <p:cNvPr id="1" name=""/>
+        <p:cNvGrpSpPr/>
+        <p:nvPr/>
+      </p:nvGrpSpPr>
+      <p:grpSpPr>
+        <a:xfrm>
+          <a:off x="0" y="0"/>
+          <a:ext cx="0" cy="0"/>
+          <a:chOff x="0" y="0"/>
+          <a:chExt cx="0" cy="0"/>
+        </a:xfrm>
+      </p:grpSpPr>
+      <p:pic>
+        <p:nvPicPr>
+          <p:cNvPr id="2" name="Image 0" descr="https://d1csarkz8obe9u.cloudfront.net/posterpreviews/company-logo-design-template-e089327a5c476ce5c70c74f7359c5898_screen.jpg?ts=1672291305">    </p:cNvPr>
+          <p:cNvPicPr>
+            <a:picLocks noChangeAspect="1"/>
+          </p:cNvPicPr>
+          <p:nvPr/>
+        </p:nvPicPr>
+        <p:blipFill>
+          <a:blip r:embed="rId2"/>
+          <a:srcRect l="0" r="0" t="0" b="0"/>
+          <a:stretch/>
+        </p:blipFill>
+        <p:spPr>
+          <a:xfrm>
+            <a:off x="7955280" y="4474845"/>
+            <a:ext cx="914400" cy="514350"/>
+          </a:xfrm>
+          <a:prstGeom prst="rect">
+            <a:avLst/>
+          </a:prstGeom>
+        </p:spPr>
+      </p:pic>
+      <p:sp>
+        <p:nvSpPr>
+          <p:cNvPr id="3" name="Text 0"/>
+          <p:cNvSpPr/>
+          <p:nvPr/>
+        </p:nvSpPr>
+        <p:spPr>
+          <a:xfrm>
+            <a:off x="457200" y="411480"/>
+            <a:ext cx="7315200" cy="411480"/>
+          </a:xfrm>
+          <a:prstGeom prst="rect">
+            <a:avLst/>
+          </a:prstGeom>
+          <a:noFill/>
+          <a:ln/>
+        </p:spPr>
+        <p:txBody>
+          <a:bodyPr wrap="square" rtlCol="0" anchor="ctr"/>
+          <a:lstStyle/>
+          <a:p>
+            <a:pPr algn="l" indent="0" marL="0">
+              <a:buNone/>
+            </a:pPr>
+            <a:r>
+              <a:rPr lang="en-US" sz="3600" dirty="0">
+                <a:solidFill>
+                  <a:srgbClr val="000000"/>
+                </a:solidFill>
+              </a:rPr>
+              <a:t>Healthcare, Consumer Devices</a:t>
+            </a:r>
+            <a:endParaRPr lang="en-US" sz="3600" dirty="0"/>
+          </a:p>
+        </p:txBody>
+      </p:sp>
+      <p:sp>
+        <p:nvSpPr>
+          <p:cNvPr id="4" name="Text 1"/>
+          <p:cNvSpPr/>
+          <p:nvPr/>
+        </p:nvSpPr>
+        <p:spPr>
+          <a:xfrm>
+            <a:off x="457200" y="874395"/>
+            <a:ext cx="7315200" cy="205740"/>
+          </a:xfrm>
+          <a:prstGeom prst="rect">
+            <a:avLst/>
+          </a:prstGeom>
+          <a:noFill/>
+          <a:ln/>
+        </p:spPr>
+        <p:txBody>
+          <a:bodyPr wrap="square" rtlCol="0" anchor="ctr"/>
+          <a:lstStyle/>
+          <a:p>
+            <a:pPr algn="l" indent="0" marL="0">
+              <a:buNone/>
+            </a:pPr>
+            <a:r>
+              <a:rPr lang="en-US" sz="2000" dirty="0">
+                <a:solidFill>
+                  <a:srgbClr val="000000"/>
+                </a:solidFill>
+              </a:rPr>
+              <a:t>United States</a:t>
+            </a:r>
+            <a:endParaRPr lang="en-US" sz="2000" dirty="0"/>
+          </a:p>
+        </p:txBody>
+      </p:sp>
+      <p:sp>
+        <p:nvSpPr>
+          <p:cNvPr id="5" name="Text 2"/>
+          <p:cNvSpPr/>
+          <p:nvPr/>
+        </p:nvSpPr>
+        <p:spPr>
+          <a:xfrm>
+            <a:off x="457200" y="1183005"/>
+            <a:ext cx="7315200" cy="3086100"/>
+          </a:xfrm>
+          <a:prstGeom prst="rect">
+            <a:avLst/>
+          </a:prstGeom>
+          <a:noFill/>
+          <a:ln/>
+        </p:spPr>
+        <p:txBody>
+          <a:bodyPr wrap="square" rtlCol="0" anchor="ctr"/>
+          <a:lstStyle/>
+          <a:p>
+            <a:pPr algn="l" indent="0" marL="0">
+              <a:buNone/>
+            </a:pPr>
+            <a:r>
+              <a:rPr lang="en-US" sz="2000" dirty="0">
+                <a:solidFill>
+                  <a:srgbClr val="000000"/>
+                </a:solidFill>
+              </a:rPr>
+              <a:t>Incontinence is an underserved 20 billion dollar market with very little innovation. Lir is developing a pre-emptive bladder fullness sensor to enable people who suffer from bladder management issues to live life to fullest. The world's first Underwearable.</a:t>
+            </a:r>
+            <a:endParaRPr lang="en-US" sz="2000" dirty="0"/>
+          </a:p>
+        </p:txBody>
+      </p:sp>
+    </p:spTree>
+  </p:cSld>
+  <p:clrMapOvr>
+    <a:masterClrMapping/>
+  </p:clrMapOvr>
+</p:sld>
+</file>
+
+<file path=ppt/slides/slide7.xml><?xml version="1.0" encoding="utf-8"?>
+<p:sld xmlns:a="http://schemas.openxmlformats.org/drawingml/2006/main" xmlns:r="http://schemas.openxmlformats.org/officeDocument/2006/relationships" xmlns:p="http://schemas.openxmlformats.org/presentationml/2006/main">
+  <p:cSld name="Slide 7">
+    <p:bg>
+      <p:bgPr>
+        <a:blipFill dpi="0" rotWithShape="1">
+          <a:blip r:embed="rId1">
+            <a:lum/>
+          </a:blip>
+          <a:srcRect/>
+          <a:stretch>
+            <a:fillRect/>
+          </a:stretch>
+        </a:blipFill>
+        <a:effectLst/>
+      </p:bgPr>
+    </p:bg>
+    <p:spTree>
+      <p:nvGrpSpPr>
+        <p:cNvPr id="1" name=""/>
+        <p:cNvGrpSpPr/>
+        <p:nvPr/>
+      </p:nvGrpSpPr>
+      <p:grpSpPr>
+        <a:xfrm>
+          <a:off x="0" y="0"/>
+          <a:ext cx="0" cy="0"/>
+          <a:chOff x="0" y="0"/>
+          <a:chExt cx="0" cy="0"/>
+        </a:xfrm>
+      </p:grpSpPr>
+      <p:pic>
+        <p:nvPicPr>
+          <p:cNvPr id="2" name="Image 0" descr="https://d1csarkz8obe9u.cloudfront.net/posterpreviews/company-logo-design-template-e089327a5c476ce5c70c74f7359c5898_screen.jpg?ts=1672291305">    </p:cNvPr>
+          <p:cNvPicPr>
+            <a:picLocks noChangeAspect="1"/>
+          </p:cNvPicPr>
+          <p:nvPr/>
+        </p:nvPicPr>
+        <p:blipFill>
+          <a:blip r:embed="rId2"/>
+          <a:srcRect l="0" r="0" t="0" b="0"/>
+          <a:stretch/>
+        </p:blipFill>
+        <p:spPr>
+          <a:xfrm>
+            <a:off x="7955280" y="4474845"/>
+            <a:ext cx="914400" cy="514350"/>
+          </a:xfrm>
+          <a:prstGeom prst="rect">
+            <a:avLst/>
+          </a:prstGeom>
+        </p:spPr>
+      </p:pic>
+      <p:sp>
+        <p:nvSpPr>
+          <p:cNvPr id="3" name="Text 0"/>
+          <p:cNvSpPr/>
+          <p:nvPr/>
+        </p:nvSpPr>
+        <p:spPr>
+          <a:xfrm>
+            <a:off x="457200" y="411480"/>
+            <a:ext cx="7315200" cy="411480"/>
+          </a:xfrm>
+          <a:prstGeom prst="rect">
+            <a:avLst/>
+          </a:prstGeom>
+          <a:noFill/>
+          <a:ln/>
+        </p:spPr>
+        <p:txBody>
+          <a:bodyPr wrap="square" rtlCol="0" anchor="ctr"/>
+          <a:lstStyle/>
+          <a:p>
+            <a:pPr algn="l" indent="0" marL="0">
+              <a:buNone/>
+            </a:pPr>
+            <a:r>
+              <a:rPr lang="en-US" sz="3600" dirty="0">
+                <a:solidFill>
+                  <a:srgbClr val="000000"/>
+                </a:solidFill>
+              </a:rPr>
+              <a:t>The Ask</a:t>
+            </a:r>
+            <a:endParaRPr lang="en-US" sz="3600" dirty="0"/>
+          </a:p>
+        </p:txBody>
+      </p:sp>
+      <p:sp>
+        <p:nvSpPr>
+          <p:cNvPr id="4" name="Text 1"/>
+          <p:cNvSpPr/>
+          <p:nvPr/>
+        </p:nvSpPr>
+        <p:spPr>
+          <a:xfrm>
+            <a:off x="457200" y="874395"/>
+            <a:ext cx="7315200" cy="205740"/>
+          </a:xfrm>
+          <a:prstGeom prst="rect">
+            <a:avLst/>
+          </a:prstGeom>
+          <a:noFill/>
+          <a:ln/>
+        </p:spPr>
+        <p:txBody>
+          <a:bodyPr wrap="square" rtlCol="0" anchor="ctr"/>
+          <a:lstStyle/>
+          <a:p>
+            <a:pPr algn="l" indent="0" marL="0">
+              <a:buNone/>
+            </a:pPr>
+            <a:r>
+              <a:rPr lang="en-US" sz="2000" dirty="0">
+                <a:solidFill>
+                  <a:srgbClr val="000000"/>
+                </a:solidFill>
+              </a:rPr>
+              <a:t>http://lirscientific.com</a:t>
+            </a:r>
+            <a:endParaRPr lang="en-US" sz="2000" dirty="0"/>
+          </a:p>
+        </p:txBody>
+      </p:sp>
+      <p:sp>
+        <p:nvSpPr>
+          <p:cNvPr id="5" name="Text 2"/>
+          <p:cNvSpPr/>
+          <p:nvPr/>
+        </p:nvSpPr>
+        <p:spPr>
+          <a:xfrm>
+            <a:off x="457200" y="1183005"/>
+            <a:ext cx="7315200" cy="3086100"/>
+          </a:xfrm>
+          <a:prstGeom prst="rect">
+            <a:avLst/>
+          </a:prstGeom>
+          <a:noFill/>
+          <a:ln/>
+        </p:spPr>
+        <p:txBody>
+          <a:bodyPr wrap="square" rtlCol="0" anchor="ctr"/>
+          <a:lstStyle/>
+          <a:p>
+            <a:pPr algn="l" indent="0" marL="0">
+              <a:buNone/>
+            </a:pPr>
+            <a:r>
+              <a:rPr lang="en-US" sz="2000" dirty="0">
+                <a:solidFill>
+                  <a:srgbClr val="000000"/>
+                </a:solidFill>
+              </a:rPr>
+              <a:t>Cyril Ebersweiler is looking for...</a:t>
+            </a:r>
+            <a:endParaRPr lang="en-US" sz="2000" dirty="0"/>
+          </a:p>
+        </p:txBody>
+      </p:sp>
+    </p:spTree>
+  </p:cSld>
+  <p:clrMapOvr>
+    <a:masterClrMapping/>
+  </p:clrMapOvr>
+</p:sld>
+</file>
+
+<file path=ppt/slides/slide8.xml><?xml version="1.0" encoding="utf-8"?>
+<p:sld xmlns:a="http://schemas.openxmlformats.org/drawingml/2006/main" xmlns:r="http://schemas.openxmlformats.org/officeDocument/2006/relationships" xmlns:p="http://schemas.openxmlformats.org/presentationml/2006/main">
+  <p:cSld name="Slide 8">
+    <p:bg>
+      <p:bgPr>
+        <a:blipFill dpi="0" rotWithShape="1">
+          <a:blip r:embed="rId1">
+            <a:lum/>
+          </a:blip>
+          <a:srcRect/>
+          <a:stretch>
+            <a:fillRect/>
+          </a:stretch>
+        </a:blipFill>
+        <a:effectLst/>
+      </p:bgPr>
+    </p:bg>
+    <p:spTree>
+      <p:nvGrpSpPr>
+        <p:cNvPr id="1" name=""/>
+        <p:cNvGrpSpPr/>
+        <p:nvPr/>
+      </p:nvGrpSpPr>
+      <p:grpSpPr>
+        <a:xfrm>
+          <a:off x="0" y="0"/>
+          <a:ext cx="0" cy="0"/>
+          <a:chOff x="0" y="0"/>
+          <a:chExt cx="0" cy="0"/>
+        </a:xfrm>
+      </p:grpSpPr>
+      <p:pic>
+        <p:nvPicPr>
+          <p:cNvPr id="2" name="Image 0" descr="https://d1csarkz8obe9u.cloudfront.net/posterpreviews/company-logo-logo-design-template-2631a0f82aff3d9b48e2513cfb234c23_screen.jpg?ts=1667643256">    </p:cNvPr>
+          <p:cNvPicPr>
+            <a:picLocks noChangeAspect="1"/>
+          </p:cNvPicPr>
+          <p:nvPr/>
+        </p:nvPicPr>
+        <p:blipFill>
+          <a:blip r:embed="rId2"/>
+          <a:srcRect l="0" r="0" t="0" b="0"/>
+          <a:stretch/>
+        </p:blipFill>
+        <p:spPr>
+          <a:xfrm>
+            <a:off x="1097280" y="1028700"/>
+            <a:ext cx="2743200" cy="1285875"/>
+          </a:xfrm>
+          <a:prstGeom prst="rect">
+            <a:avLst/>
+          </a:prstGeom>
+        </p:spPr>
+      </p:pic>
+      <p:sp>
+        <p:nvSpPr>
+          <p:cNvPr id="3" name="Text 0"/>
+          <p:cNvSpPr/>
+          <p:nvPr/>
+        </p:nvSpPr>
+        <p:spPr>
+          <a:xfrm>
+            <a:off x="1097280" y="2314575"/>
+            <a:ext cx="3383280" cy="771525"/>
+          </a:xfrm>
+          <a:prstGeom prst="rect">
+            <a:avLst/>
+          </a:prstGeom>
+          <a:noFill/>
+          <a:ln/>
+        </p:spPr>
+        <p:txBody>
+          <a:bodyPr wrap="square" rtlCol="0" anchor="ctr"/>
+          <a:lstStyle/>
+          <a:p>
+            <a:pPr indent="0" marL="0">
+              <a:buNone/>
+            </a:pPr>
+            <a:r>
+              <a:rPr lang="en-US" sz="4000" dirty="0">
+                <a:solidFill>
+                  <a:srgbClr val="000000"/>
+                </a:solidFill>
+              </a:rPr>
+              <a:t>Biomr</a:t>
+            </a:r>
+            <a:endParaRPr lang="en-US" sz="4000" dirty="0"/>
+          </a:p>
+        </p:txBody>
+      </p:sp>
+      <p:sp>
+        <p:nvSpPr>
+          <p:cNvPr id="4" name="Text 1"/>
+          <p:cNvSpPr/>
+          <p:nvPr/>
+        </p:nvSpPr>
+        <p:spPr>
+          <a:xfrm>
+            <a:off x="5486400" y="3343275"/>
+            <a:ext cx="3383280" cy="1543050"/>
+          </a:xfrm>
+          <a:prstGeom prst="rect">
+            <a:avLst/>
+          </a:prstGeom>
+          <a:noFill/>
+          <a:ln/>
+        </p:spPr>
+        <p:txBody>
+          <a:bodyPr wrap="square" rtlCol="0" anchor="ctr"/>
+          <a:lstStyle/>
+          <a:p>
+            <a:pPr algn="ctr" indent="0" marL="0">
+              <a:buNone/>
+            </a:pPr>
+            <a:r>
+              <a:rPr lang="en-US" sz="2000" dirty="0">
+                <a:solidFill>
+                  <a:srgbClr val="000000"/>
+                </a:solidFill>
+              </a:rPr>
+              <a:t>Our mission is to make the future of fibre technology.</a:t>
+            </a:r>
+            <a:endParaRPr lang="en-US" sz="2000" dirty="0"/>
+          </a:p>
+        </p:txBody>
+      </p:sp>
+    </p:spTree>
+  </p:cSld>
+  <p:clrMapOvr>
+    <a:masterClrMapping/>
+  </p:clrMapOvr>
+</p:sld>
+</file>
+
+<file path=ppt/slides/slide9.xml><?xml version="1.0" encoding="utf-8"?>
+<p:sld xmlns:a="http://schemas.openxmlformats.org/drawingml/2006/main" xmlns:r="http://schemas.openxmlformats.org/officeDocument/2006/relationships" xmlns:p="http://schemas.openxmlformats.org/presentationml/2006/main">
+  <p:cSld name="Slide 9">
+    <p:bg>
+      <p:bgPr>
+        <a:blipFill dpi="0" rotWithShape="1">
+          <a:blip r:embed="rId1">
+            <a:lum/>
+          </a:blip>
+          <a:srcRect/>
+          <a:stretch>
+            <a:fillRect/>
+          </a:stretch>
+        </a:blipFill>
+        <a:effectLst/>
+      </p:bgPr>
+    </p:bg>
+    <p:spTree>
+      <p:nvGrpSpPr>
+        <p:cNvPr id="1" name=""/>
+        <p:cNvGrpSpPr/>
+        <p:nvPr/>
+      </p:nvGrpSpPr>
+      <p:grpSpPr>
+        <a:xfrm>
+          <a:off x="0" y="0"/>
+          <a:ext cx="0" cy="0"/>
+          <a:chOff x="0" y="0"/>
+          <a:chExt cx="0" cy="0"/>
+        </a:xfrm>
+      </p:grpSpPr>
+      <p:pic>
+        <p:nvPicPr>
+          <p:cNvPr id="2" name="Image 0" descr="https://d1csarkz8obe9u.cloudfront.net/posterpreviews/company-logo-logo-design-template-2631a0f82aff3d9b48e2513cfb234c23_screen.jpg?ts=1667643256">    </p:cNvPr>
+          <p:cNvPicPr>
+            <a:picLocks noChangeAspect="1"/>
+          </p:cNvPicPr>
+          <p:nvPr/>
+        </p:nvPicPr>
+        <p:blipFill>
+          <a:blip r:embed="rId2"/>
+          <a:srcRect l="0" r="0" t="0" b="0"/>
+          <a:stretch/>
+        </p:blipFill>
+        <p:spPr>
+          <a:xfrm>
+            <a:off x="7955280" y="4474845"/>
+            <a:ext cx="914400" cy="514350"/>
+          </a:xfrm>
+          <a:prstGeom prst="rect">
+            <a:avLst/>
+          </a:prstGeom>
+        </p:spPr>
+      </p:pic>
+      <p:sp>
+        <p:nvSpPr>
+          <p:cNvPr id="3" name="Text 0"/>
+          <p:cNvSpPr/>
+          <p:nvPr/>
+        </p:nvSpPr>
+        <p:spPr>
+          <a:xfrm>
+            <a:off x="457200" y="411480"/>
+            <a:ext cx="7315200" cy="411480"/>
+          </a:xfrm>
+          <a:prstGeom prst="rect">
+            <a:avLst/>
+          </a:prstGeom>
+          <a:noFill/>
+          <a:ln/>
+        </p:spPr>
+        <p:txBody>
+          <a:bodyPr wrap="square" rtlCol="0" anchor="ctr"/>
+          <a:lstStyle/>
+          <a:p>
+            <a:pPr algn="l" indent="0" marL="0">
+              <a:buNone/>
+            </a:pPr>
+            <a:r>
+              <a:rPr lang="en-US" sz="3600" dirty="0">
+                <a:solidFill>
+                  <a:srgbClr val="000000"/>
+                </a:solidFill>
+              </a:rPr>
+              <a:t>Industrial Equipment</a:t>
+            </a:r>
+            <a:endParaRPr lang="en-US" sz="3600" dirty="0"/>
+          </a:p>
+        </p:txBody>
+      </p:sp>
+      <p:sp>
+        <p:nvSpPr>
+          <p:cNvPr id="4" name="Text 1"/>
+          <p:cNvSpPr/>
+          <p:nvPr/>
+        </p:nvSpPr>
+        <p:spPr>
+          <a:xfrm>
+            <a:off x="457200" y="874395"/>
+            <a:ext cx="7315200" cy="205740"/>
+          </a:xfrm>
+          <a:prstGeom prst="rect">
+            <a:avLst/>
+          </a:prstGeom>
+          <a:noFill/>
+          <a:ln/>
+        </p:spPr>
+        <p:txBody>
+          <a:bodyPr wrap="square" rtlCol="0" anchor="ctr"/>
+          <a:lstStyle/>
+          <a:p>
+            <a:pPr algn="l" indent="0" marL="0">
+              <a:buNone/>
+            </a:pPr>
+            <a:r>
+              <a:rPr lang="en-US" sz="2000" dirty="0">
+                <a:solidFill>
+                  <a:srgbClr val="000000"/>
+                </a:solidFill>
+              </a:rPr>
+              <a:t>United Kingdom</a:t>
+            </a:r>
+            <a:endParaRPr lang="en-US" sz="2000" dirty="0"/>
+          </a:p>
+        </p:txBody>
+      </p:sp>
+      <p:sp>
+        <p:nvSpPr>
+          <p:cNvPr id="5" name="Text 2"/>
+          <p:cNvSpPr/>
+          <p:nvPr/>
+        </p:nvSpPr>
+        <p:spPr>
+          <a:xfrm>
+            <a:off x="457200" y="1183005"/>
+            <a:ext cx="7315200" cy="3086100"/>
+          </a:xfrm>
+          <a:prstGeom prst="rect">
+            <a:avLst/>
+          </a:prstGeom>
+          <a:noFill/>
+          <a:ln/>
+        </p:spPr>
+        <p:txBody>
+          <a:bodyPr wrap="square" rtlCol="0" anchor="ctr"/>
+          <a:lstStyle/>
+          <a:p>
+            <a:pPr algn="l" indent="0" marL="0">
+              <a:buNone/>
+            </a:pPr>
+            <a:r>
+              <a:rPr lang="en-US" sz="2000" dirty="0">
+                <a:solidFill>
+                  <a:srgbClr val="000000"/>
+                </a:solidFill>
+              </a:rPr>
+              <a:t>We make water-proof and oil-proof coatings from renewable organic sources, free from forever chemicals (PFAS) and free from synthetic plastics (polyurethanes).</a:t>
+            </a:r>
+            <a:endParaRPr lang="en-US" sz="2000" dirty="0"/>
+          </a:p>
+          <a:p>
+            <a:pPr algn="l" indent="0" marL="0">
+              <a:buNone/>
+            </a:pPr>
+            <a:endParaRPr lang="en-US" sz="2000" dirty="0"/>
+          </a:p>
+          <a:p>
+            <a:pPr algn="l" indent="0" marL="0">
+              <a:buNone/>
+            </a:pPr>
+            <a:r>
+              <a:rPr lang="en-US" sz="2000" dirty="0">
+                <a:solidFill>
+                  <a:srgbClr val="000000"/>
+                </a:solidFill>
+              </a:rPr>
+              <a:t>We upcycle agricultural waste to valuable textile finishes. Our processing is low in water and energy.</a:t>
             </a:r>
             <a:endParaRPr lang="en-US" sz="2000" dirty="0"/>
           </a:p>

</xml_diff>

<commit_message>
Added ReadME file and updated styling for presentation
</commit_message>
<xml_diff>
--- a/demo.pptx
+++ b/demo.pptx
@@ -1858,7 +1858,7 @@
         <p:spPr>
           <a:xfrm>
             <a:off x="7955280" y="4474845"/>
-            <a:ext cx="914400" cy="514350"/>
+            <a:ext cx="914400" cy="914400"/>
           </a:xfrm>
           <a:prstGeom prst="rect">
             <a:avLst/>
@@ -2062,7 +2062,7 @@
             <a:r>
               <a:rPr lang="en-US" sz="4000" dirty="0">
                 <a:solidFill>
-                  <a:srgbClr val="000000"/>
+                  <a:srgbClr val="FFFFFF"/>
                 </a:solidFill>
               </a:rPr>
               <a:t>3rd Ear</a:t>
@@ -2162,7 +2162,7 @@
         <p:spPr>
           <a:xfrm>
             <a:off x="7955280" y="4474845"/>
-            <a:ext cx="914400" cy="514350"/>
+            <a:ext cx="914400" cy="914400"/>
           </a:xfrm>
           <a:prstGeom prst="rect">
             <a:avLst/>
@@ -2332,7 +2332,7 @@
         <p:spPr>
           <a:xfrm>
             <a:off x="7955280" y="4474845"/>
-            <a:ext cx="914400" cy="514350"/>
+            <a:ext cx="914400" cy="914400"/>
           </a:xfrm>
           <a:prstGeom prst="rect">
             <a:avLst/>
@@ -2536,7 +2536,7 @@
             <a:r>
               <a:rPr lang="en-US" sz="4000" dirty="0">
                 <a:solidFill>
-                  <a:srgbClr val="000000"/>
+                  <a:srgbClr val="FFFFFF"/>
                 </a:solidFill>
               </a:rPr>
               <a:t>Lir Scientific</a:t>
@@ -2636,7 +2636,7 @@
         <p:spPr>
           <a:xfrm>
             <a:off x="7955280" y="4474845"/>
-            <a:ext cx="914400" cy="514350"/>
+            <a:ext cx="914400" cy="914400"/>
           </a:xfrm>
           <a:prstGeom prst="rect">
             <a:avLst/>
@@ -2806,7 +2806,7 @@
         <p:spPr>
           <a:xfrm>
             <a:off x="7955280" y="4474845"/>
-            <a:ext cx="914400" cy="514350"/>
+            <a:ext cx="914400" cy="914400"/>
           </a:xfrm>
           <a:prstGeom prst="rect">
             <a:avLst/>
@@ -3010,7 +3010,7 @@
             <a:r>
               <a:rPr lang="en-US" sz="4000" dirty="0">
                 <a:solidFill>
-                  <a:srgbClr val="000000"/>
+                  <a:srgbClr val="FFFFFF"/>
                 </a:solidFill>
               </a:rPr>
               <a:t>Biomr</a:t>
@@ -3110,7 +3110,7 @@
         <p:spPr>
           <a:xfrm>
             <a:off x="7955280" y="4474845"/>
-            <a:ext cx="914400" cy="514350"/>
+            <a:ext cx="914400" cy="914400"/>
           </a:xfrm>
           <a:prstGeom prst="rect">
             <a:avLst/>

</xml_diff>